<commit_message>
fix some mistake on presentation file
</commit_message>
<xml_diff>
--- a/session3/presentation/Raspberry_pi_Controlling_Hardware.pptx
+++ b/session3/presentation/Raspberry_pi_Controlling_Hardware.pptx
@@ -272,7 +272,7 @@
           <a:p>
             <a:fld id="{1139FA4A-C808-4981-8BA9-64217A6CCEA7}" type="datetimeFigureOut">
               <a:rPr lang="en-US" smtClean="0"/>
-              <a:t>9/11/2017</a:t>
+              <a:t>3/16/2018</a:t>
             </a:fld>
             <a:endParaRPr lang="en-US"/>
           </a:p>
@@ -440,7 +440,7 @@
           <a:p>
             <a:fld id="{1139FA4A-C808-4981-8BA9-64217A6CCEA7}" type="datetimeFigureOut">
               <a:rPr lang="en-US" smtClean="0"/>
-              <a:t>9/11/2017</a:t>
+              <a:t>3/16/2018</a:t>
             </a:fld>
             <a:endParaRPr lang="en-US"/>
           </a:p>
@@ -618,7 +618,7 @@
           <a:p>
             <a:fld id="{1139FA4A-C808-4981-8BA9-64217A6CCEA7}" type="datetimeFigureOut">
               <a:rPr lang="en-US" smtClean="0"/>
-              <a:t>9/11/2017</a:t>
+              <a:t>3/16/2018</a:t>
             </a:fld>
             <a:endParaRPr lang="en-US"/>
           </a:p>
@@ -786,7 +786,7 @@
           <a:p>
             <a:fld id="{1139FA4A-C808-4981-8BA9-64217A6CCEA7}" type="datetimeFigureOut">
               <a:rPr lang="en-US" smtClean="0"/>
-              <a:t>9/11/2017</a:t>
+              <a:t>3/16/2018</a:t>
             </a:fld>
             <a:endParaRPr lang="en-US"/>
           </a:p>
@@ -1031,7 +1031,7 @@
           <a:p>
             <a:fld id="{1139FA4A-C808-4981-8BA9-64217A6CCEA7}" type="datetimeFigureOut">
               <a:rPr lang="en-US" smtClean="0"/>
-              <a:t>9/11/2017</a:t>
+              <a:t>3/16/2018</a:t>
             </a:fld>
             <a:endParaRPr lang="en-US"/>
           </a:p>
@@ -1260,7 +1260,7 @@
           <a:p>
             <a:fld id="{1139FA4A-C808-4981-8BA9-64217A6CCEA7}" type="datetimeFigureOut">
               <a:rPr lang="en-US" smtClean="0"/>
-              <a:t>9/11/2017</a:t>
+              <a:t>3/16/2018</a:t>
             </a:fld>
             <a:endParaRPr lang="en-US"/>
           </a:p>
@@ -1624,7 +1624,7 @@
           <a:p>
             <a:fld id="{1139FA4A-C808-4981-8BA9-64217A6CCEA7}" type="datetimeFigureOut">
               <a:rPr lang="en-US" smtClean="0"/>
-              <a:t>9/11/2017</a:t>
+              <a:t>3/16/2018</a:t>
             </a:fld>
             <a:endParaRPr lang="en-US"/>
           </a:p>
@@ -1741,7 +1741,7 @@
           <a:p>
             <a:fld id="{1139FA4A-C808-4981-8BA9-64217A6CCEA7}" type="datetimeFigureOut">
               <a:rPr lang="en-US" smtClean="0"/>
-              <a:t>9/11/2017</a:t>
+              <a:t>3/16/2018</a:t>
             </a:fld>
             <a:endParaRPr lang="en-US"/>
           </a:p>
@@ -1836,7 +1836,7 @@
           <a:p>
             <a:fld id="{1139FA4A-C808-4981-8BA9-64217A6CCEA7}" type="datetimeFigureOut">
               <a:rPr lang="en-US" smtClean="0"/>
-              <a:t>9/11/2017</a:t>
+              <a:t>3/16/2018</a:t>
             </a:fld>
             <a:endParaRPr lang="en-US"/>
           </a:p>
@@ -2111,7 +2111,7 @@
           <a:p>
             <a:fld id="{1139FA4A-C808-4981-8BA9-64217A6CCEA7}" type="datetimeFigureOut">
               <a:rPr lang="en-US" smtClean="0"/>
-              <a:t>9/11/2017</a:t>
+              <a:t>3/16/2018</a:t>
             </a:fld>
             <a:endParaRPr lang="en-US"/>
           </a:p>
@@ -2363,7 +2363,7 @@
           <a:p>
             <a:fld id="{1139FA4A-C808-4981-8BA9-64217A6CCEA7}" type="datetimeFigureOut">
               <a:rPr lang="en-US" smtClean="0"/>
-              <a:t>9/11/2017</a:t>
+              <a:t>3/16/2018</a:t>
             </a:fld>
             <a:endParaRPr lang="en-US"/>
           </a:p>
@@ -2574,7 +2574,7 @@
           <a:p>
             <a:fld id="{1139FA4A-C808-4981-8BA9-64217A6CCEA7}" type="datetimeFigureOut">
               <a:rPr lang="en-US" smtClean="0"/>
-              <a:t>9/11/2017</a:t>
+              <a:t>3/16/2018</a:t>
             </a:fld>
             <a:endParaRPr lang="en-US"/>
           </a:p>
@@ -4731,14 +4731,14 @@
               <a:buChar char="•"/>
             </a:pPr>
             <a:r>
-              <a:rPr lang="en-US" sz="2000" b="1" i="1" dirty="0" err="1">
-                <a:solidFill>
-                  <a:srgbClr val="0070C0"/>
-                </a:solidFill>
-                <a:latin typeface="Consolas" panose="020B0609020204030204" pitchFamily="49" charset="0"/>
-                <a:cs typeface="Consolas" panose="020B0609020204030204" pitchFamily="49" charset="0"/>
-              </a:rPr>
-              <a:t>GPIO.setup</a:t>
+              <a:rPr lang="en-US" sz="2000" b="1" i="1" dirty="0" smtClean="0">
+                <a:solidFill>
+                  <a:srgbClr val="0070C0"/>
+                </a:solidFill>
+                <a:latin typeface="Consolas" panose="020B0609020204030204" pitchFamily="49" charset="0"/>
+                <a:cs typeface="Consolas" panose="020B0609020204030204" pitchFamily="49" charset="0"/>
+              </a:rPr>
+              <a:t>GPIO.setup(pin, </a:t>
             </a:r>
             <a:r>
               <a:rPr lang="en-US" sz="2000" b="1" i="1" dirty="0">
@@ -4748,27 +4748,7 @@
                 <a:latin typeface="Consolas" panose="020B0609020204030204" pitchFamily="49" charset="0"/>
                 <a:cs typeface="Consolas" panose="020B0609020204030204" pitchFamily="49" charset="0"/>
               </a:rPr>
-              <a:t>(</a:t>
-            </a:r>
-            <a:r>
-              <a:rPr lang="en-US" sz="2000" b="1" i="1" dirty="0" err="1">
-                <a:solidFill>
-                  <a:srgbClr val="0070C0"/>
-                </a:solidFill>
-                <a:latin typeface="Consolas" panose="020B0609020204030204" pitchFamily="49" charset="0"/>
-                <a:cs typeface="Consolas" panose="020B0609020204030204" pitchFamily="49" charset="0"/>
-              </a:rPr>
-              <a:t>pin_Number</a:t>
-            </a:r>
-            <a:r>
-              <a:rPr lang="en-US" sz="2000" b="1" i="1" dirty="0">
-                <a:solidFill>
-                  <a:srgbClr val="0070C0"/>
-                </a:solidFill>
-                <a:latin typeface="Consolas" panose="020B0609020204030204" pitchFamily="49" charset="0"/>
-                <a:cs typeface="Consolas" panose="020B0609020204030204" pitchFamily="49" charset="0"/>
-              </a:rPr>
-              <a:t>, GPIO.OUT)</a:t>
+              <a:t>GPIO.OUT)</a:t>
             </a:r>
           </a:p>
           <a:p>
@@ -4940,16 +4920,6 @@
               <a:buChar char="•"/>
             </a:pPr>
             <a:r>
-              <a:rPr lang="en-US" sz="2000" b="1" i="1" dirty="0" err="1">
-                <a:solidFill>
-                  <a:srgbClr val="0070C0"/>
-                </a:solidFill>
-                <a:latin typeface="Consolas" panose="020B0609020204030204" pitchFamily="49" charset="0"/>
-                <a:cs typeface="Consolas" panose="020B0609020204030204" pitchFamily="49" charset="0"/>
-              </a:rPr>
-              <a:t>pwm_led.ChangeDutyCycle</a:t>
-            </a:r>
-            <a:r>
               <a:rPr lang="en-US" sz="2000" b="1" i="1" dirty="0">
                 <a:solidFill>
                   <a:srgbClr val="0070C0"/>
@@ -4957,17 +4927,7 @@
                 <a:latin typeface="Consolas" panose="020B0609020204030204" pitchFamily="49" charset="0"/>
                 <a:cs typeface="Consolas" panose="020B0609020204030204" pitchFamily="49" charset="0"/>
               </a:rPr>
-              <a:t>(</a:t>
-            </a:r>
-            <a:r>
-              <a:rPr lang="en-US" sz="2000" b="1" i="1" dirty="0" err="1">
-                <a:solidFill>
-                  <a:srgbClr val="0070C0"/>
-                </a:solidFill>
-                <a:latin typeface="Consolas" panose="020B0609020204030204" pitchFamily="49" charset="0"/>
-                <a:cs typeface="Consolas" panose="020B0609020204030204" pitchFamily="49" charset="0"/>
-              </a:rPr>
-              <a:t>duty_percent</a:t>
+              <a:t>Pwm_var.ChangeDutyCycle(duty_percent</a:t>
             </a:r>
             <a:r>
               <a:rPr lang="en-US" sz="2000" b="1" i="1" dirty="0">

</xml_diff>